<commit_message>
Updated suggested lab icons for Clone, Sync and Positions labs
</commit_message>
<xml_diff>
--- a/doc/Icons-CloneLab.pptx
+++ b/doc/Icons-CloneLab.pptx
@@ -107,6 +107,22 @@
       </a:defRPr>
     </a:lvl9pPr>
   </p:defaultTextStyle>
+  <p:extLst>
+    <p:ext uri="{EFAFB233-063F-42B5-8137-9DF3F51BA10A}">
+      <p15:sldGuideLst xmlns:p15="http://schemas.microsoft.com/office/powerpoint/2012/main">
+        <p15:guide id="1" orient="horz" pos="2160">
+          <p15:clr>
+            <a:srgbClr val="A4A3A4"/>
+          </p15:clr>
+        </p15:guide>
+        <p15:guide id="2" pos="2880">
+          <p15:clr>
+            <a:srgbClr val="A4A3A4"/>
+          </p15:clr>
+        </p15:guide>
+      </p15:sldGuideLst>
+    </p:ext>
+  </p:extLst>
 </p:presentation>
 </file>
 
@@ -192,7 +208,7 @@
           <a:p>
             <a:fld id="{6699ACB9-486C-4D62-A3A7-AF98E13EFDA3}" type="datetimeFigureOut">
               <a:rPr lang="en-US" smtClean="0"/>
-              <a:t>2/6/2016</a:t>
+              <a:t>2/25/2016</a:t>
             </a:fld>
             <a:endParaRPr lang="en-US"/>
           </a:p>
@@ -642,7 +658,7 @@
             <a:fld id="{1D8BD707-D9CF-40AE-B4C6-C98DA3205C09}" type="datetimeFigureOut">
               <a:rPr lang="en-US" smtClean="0"/>
               <a:pPr/>
-              <a:t>2/6/2016</a:t>
+              <a:t>2/25/2016</a:t>
             </a:fld>
             <a:endParaRPr lang="en-US"/>
           </a:p>
@@ -809,7 +825,7 @@
             <a:fld id="{1D8BD707-D9CF-40AE-B4C6-C98DA3205C09}" type="datetimeFigureOut">
               <a:rPr lang="en-US" smtClean="0"/>
               <a:pPr/>
-              <a:t>2/6/2016</a:t>
+              <a:t>2/25/2016</a:t>
             </a:fld>
             <a:endParaRPr lang="en-US"/>
           </a:p>
@@ -986,7 +1002,7 @@
             <a:fld id="{1D8BD707-D9CF-40AE-B4C6-C98DA3205C09}" type="datetimeFigureOut">
               <a:rPr lang="en-US" smtClean="0"/>
               <a:pPr/>
-              <a:t>2/6/2016</a:t>
+              <a:t>2/25/2016</a:t>
             </a:fld>
             <a:endParaRPr lang="en-US"/>
           </a:p>
@@ -1153,7 +1169,7 @@
             <a:fld id="{1D8BD707-D9CF-40AE-B4C6-C98DA3205C09}" type="datetimeFigureOut">
               <a:rPr lang="en-US" smtClean="0"/>
               <a:pPr/>
-              <a:t>2/6/2016</a:t>
+              <a:t>2/25/2016</a:t>
             </a:fld>
             <a:endParaRPr lang="en-US"/>
           </a:p>
@@ -1396,7 +1412,7 @@
             <a:fld id="{1D8BD707-D9CF-40AE-B4C6-C98DA3205C09}" type="datetimeFigureOut">
               <a:rPr lang="en-US" smtClean="0"/>
               <a:pPr/>
-              <a:t>2/6/2016</a:t>
+              <a:t>2/25/2016</a:t>
             </a:fld>
             <a:endParaRPr lang="en-US"/>
           </a:p>
@@ -1681,7 +1697,7 @@
             <a:fld id="{1D8BD707-D9CF-40AE-B4C6-C98DA3205C09}" type="datetimeFigureOut">
               <a:rPr lang="en-US" smtClean="0"/>
               <a:pPr/>
-              <a:t>2/6/2016</a:t>
+              <a:t>2/25/2016</a:t>
             </a:fld>
             <a:endParaRPr lang="en-US"/>
           </a:p>
@@ -2100,7 +2116,7 @@
             <a:fld id="{1D8BD707-D9CF-40AE-B4C6-C98DA3205C09}" type="datetimeFigureOut">
               <a:rPr lang="en-US" smtClean="0"/>
               <a:pPr/>
-              <a:t>2/6/2016</a:t>
+              <a:t>2/25/2016</a:t>
             </a:fld>
             <a:endParaRPr lang="en-US"/>
           </a:p>
@@ -2215,7 +2231,7 @@
             <a:fld id="{1D8BD707-D9CF-40AE-B4C6-C98DA3205C09}" type="datetimeFigureOut">
               <a:rPr lang="en-US" smtClean="0"/>
               <a:pPr/>
-              <a:t>2/6/2016</a:t>
+              <a:t>2/25/2016</a:t>
             </a:fld>
             <a:endParaRPr lang="en-US"/>
           </a:p>
@@ -2307,7 +2323,7 @@
             <a:fld id="{1D8BD707-D9CF-40AE-B4C6-C98DA3205C09}" type="datetimeFigureOut">
               <a:rPr lang="en-US" smtClean="0"/>
               <a:pPr/>
-              <a:t>2/6/2016</a:t>
+              <a:t>2/25/2016</a:t>
             </a:fld>
             <a:endParaRPr lang="en-US"/>
           </a:p>
@@ -2581,7 +2597,7 @@
             <a:fld id="{1D8BD707-D9CF-40AE-B4C6-C98DA3205C09}" type="datetimeFigureOut">
               <a:rPr lang="en-US" smtClean="0"/>
               <a:pPr/>
-              <a:t>2/6/2016</a:t>
+              <a:t>2/25/2016</a:t>
             </a:fld>
             <a:endParaRPr lang="en-US"/>
           </a:p>
@@ -2831,7 +2847,7 @@
             <a:fld id="{1D8BD707-D9CF-40AE-B4C6-C98DA3205C09}" type="datetimeFigureOut">
               <a:rPr lang="en-US" smtClean="0"/>
               <a:pPr/>
-              <a:t>2/6/2016</a:t>
+              <a:t>2/25/2016</a:t>
             </a:fld>
             <a:endParaRPr lang="en-US"/>
           </a:p>
@@ -3041,7 +3057,7 @@
             <a:fld id="{1D8BD707-D9CF-40AE-B4C6-C98DA3205C09}" type="datetimeFigureOut">
               <a:rPr lang="en-US" smtClean="0"/>
               <a:pPr/>
-              <a:t>2/6/2016</a:t>
+              <a:t>2/25/2016</a:t>
             </a:fld>
             <a:endParaRPr lang="en-US"/>
           </a:p>
@@ -3824,6 +3840,251 @@
           </a:extLst>
         </p:spPr>
       </p:pic>
+      <p:sp>
+        <p:nvSpPr>
+          <p:cNvPr id="9" name="Rectangle 4"/>
+          <p:cNvSpPr>
+            <a:spLocks/>
+          </p:cNvSpPr>
+          <p:nvPr/>
+        </p:nvSpPr>
+        <p:spPr>
+          <a:xfrm rot="16200000">
+            <a:off x="1835839" y="3522706"/>
+            <a:ext cx="700291" cy="690781"/>
+          </a:xfrm>
+          <a:custGeom>
+            <a:avLst/>
+            <a:gdLst/>
+            <a:ahLst/>
+            <a:cxnLst/>
+            <a:rect l="l" t="t" r="r" b="b"/>
+            <a:pathLst>
+              <a:path w="1752603" h="1752600">
+                <a:moveTo>
+                  <a:pt x="533400" y="0"/>
+                </a:moveTo>
+                <a:lnTo>
+                  <a:pt x="533403" y="0"/>
+                </a:lnTo>
+                <a:lnTo>
+                  <a:pt x="1066800" y="0"/>
+                </a:lnTo>
+                <a:lnTo>
+                  <a:pt x="1752603" y="0"/>
+                </a:lnTo>
+                <a:lnTo>
+                  <a:pt x="1752603" y="1752600"/>
+                </a:lnTo>
+                <a:lnTo>
+                  <a:pt x="1219203" y="1752600"/>
+                </a:lnTo>
+                <a:lnTo>
+                  <a:pt x="533403" y="1752600"/>
+                </a:lnTo>
+                <a:lnTo>
+                  <a:pt x="3" y="1752600"/>
+                </a:lnTo>
+                <a:lnTo>
+                  <a:pt x="3" y="533430"/>
+                </a:lnTo>
+                <a:cubicBezTo>
+                  <a:pt x="0" y="533420"/>
+                  <a:pt x="0" y="533410"/>
+                  <a:pt x="0" y="533400"/>
+                </a:cubicBezTo>
+                <a:cubicBezTo>
+                  <a:pt x="0" y="238811"/>
+                  <a:pt x="238811" y="0"/>
+                  <a:pt x="533400" y="0"/>
+                </a:cubicBezTo>
+                <a:close/>
+              </a:path>
+            </a:pathLst>
+          </a:custGeom>
+          <a:noFill/>
+          <a:ln w="76200" cmpd="sng">
+            <a:solidFill>
+              <a:srgbClr val="0070C0"/>
+            </a:solidFill>
+            <a:miter lim="800000"/>
+          </a:ln>
+        </p:spPr>
+        <p:style>
+          <a:lnRef idx="2">
+            <a:schemeClr val="accent1">
+              <a:shade val="50000"/>
+            </a:schemeClr>
+          </a:lnRef>
+          <a:fillRef idx="1">
+            <a:schemeClr val="accent1"/>
+          </a:fillRef>
+          <a:effectRef idx="0">
+            <a:schemeClr val="accent1"/>
+          </a:effectRef>
+          <a:fontRef idx="minor">
+            <a:schemeClr val="lt1"/>
+          </a:fontRef>
+        </p:style>
+        <p:txBody>
+          <a:bodyPr rtlCol="0" anchor="ctr"/>
+          <a:lstStyle/>
+          <a:p>
+            <a:pPr algn="ctr"/>
+            <a:endParaRPr lang="en-US"/>
+          </a:p>
+        </p:txBody>
+      </p:sp>
+      <p:sp>
+        <p:nvSpPr>
+          <p:cNvPr id="10" name="Rectangle 9"/>
+          <p:cNvSpPr>
+            <a:spLocks/>
+          </p:cNvSpPr>
+          <p:nvPr/>
+        </p:nvSpPr>
+        <p:spPr>
+          <a:xfrm>
+            <a:off x="2159469" y="3603195"/>
+            <a:ext cx="288582" cy="291155"/>
+          </a:xfrm>
+          <a:prstGeom prst="rect">
+            <a:avLst/>
+          </a:prstGeom>
+          <a:solidFill>
+            <a:srgbClr val="E46B09"/>
+          </a:solidFill>
+          <a:ln>
+            <a:solidFill>
+              <a:srgbClr val="0070C0"/>
+            </a:solidFill>
+          </a:ln>
+        </p:spPr>
+        <p:style>
+          <a:lnRef idx="2">
+            <a:schemeClr val="accent1">
+              <a:shade val="50000"/>
+            </a:schemeClr>
+          </a:lnRef>
+          <a:fillRef idx="1">
+            <a:schemeClr val="accent1"/>
+          </a:fillRef>
+          <a:effectRef idx="0">
+            <a:schemeClr val="accent1"/>
+          </a:effectRef>
+          <a:fontRef idx="minor">
+            <a:schemeClr val="lt1"/>
+          </a:fontRef>
+        </p:style>
+        <p:txBody>
+          <a:bodyPr rtlCol="0" anchor="ctr"/>
+          <a:lstStyle/>
+          <a:p>
+            <a:pPr algn="ctr"/>
+            <a:endParaRPr lang="en-US"/>
+          </a:p>
+        </p:txBody>
+      </p:sp>
+      <p:sp>
+        <p:nvSpPr>
+          <p:cNvPr id="11" name="Rectangle 10"/>
+          <p:cNvSpPr>
+            <a:spLocks/>
+          </p:cNvSpPr>
+          <p:nvPr/>
+        </p:nvSpPr>
+        <p:spPr>
+          <a:xfrm>
+            <a:off x="2070569" y="3692095"/>
+            <a:ext cx="288582" cy="291155"/>
+          </a:xfrm>
+          <a:prstGeom prst="rect">
+            <a:avLst/>
+          </a:prstGeom>
+          <a:solidFill>
+            <a:srgbClr val="E46B09"/>
+          </a:solidFill>
+          <a:ln>
+            <a:solidFill>
+              <a:srgbClr val="0070C0"/>
+            </a:solidFill>
+          </a:ln>
+        </p:spPr>
+        <p:style>
+          <a:lnRef idx="2">
+            <a:schemeClr val="accent1">
+              <a:shade val="50000"/>
+            </a:schemeClr>
+          </a:lnRef>
+          <a:fillRef idx="1">
+            <a:schemeClr val="accent1"/>
+          </a:fillRef>
+          <a:effectRef idx="0">
+            <a:schemeClr val="accent1"/>
+          </a:effectRef>
+          <a:fontRef idx="minor">
+            <a:schemeClr val="lt1"/>
+          </a:fontRef>
+        </p:style>
+        <p:txBody>
+          <a:bodyPr rtlCol="0" anchor="ctr"/>
+          <a:lstStyle/>
+          <a:p>
+            <a:pPr algn="ctr"/>
+            <a:endParaRPr lang="en-US"/>
+          </a:p>
+        </p:txBody>
+      </p:sp>
+      <p:sp>
+        <p:nvSpPr>
+          <p:cNvPr id="12" name="Rectangle 11"/>
+          <p:cNvSpPr>
+            <a:spLocks/>
+          </p:cNvSpPr>
+          <p:nvPr/>
+        </p:nvSpPr>
+        <p:spPr>
+          <a:xfrm>
+            <a:off x="1962619" y="3780995"/>
+            <a:ext cx="288582" cy="291155"/>
+          </a:xfrm>
+          <a:prstGeom prst="rect">
+            <a:avLst/>
+          </a:prstGeom>
+          <a:solidFill>
+            <a:srgbClr val="E46B09"/>
+          </a:solidFill>
+          <a:ln>
+            <a:solidFill>
+              <a:srgbClr val="0070C0"/>
+            </a:solidFill>
+          </a:ln>
+        </p:spPr>
+        <p:style>
+          <a:lnRef idx="2">
+            <a:schemeClr val="accent1">
+              <a:shade val="50000"/>
+            </a:schemeClr>
+          </a:lnRef>
+          <a:fillRef idx="1">
+            <a:schemeClr val="accent1"/>
+          </a:fillRef>
+          <a:effectRef idx="0">
+            <a:schemeClr val="accent1"/>
+          </a:effectRef>
+          <a:fontRef idx="minor">
+            <a:schemeClr val="lt1"/>
+          </a:fontRef>
+        </p:style>
+        <p:txBody>
+          <a:bodyPr rtlCol="0" anchor="ctr"/>
+          <a:lstStyle/>
+          <a:p>
+            <a:pPr algn="ctr"/>
+            <a:endParaRPr lang="en-US"/>
+          </a:p>
+        </p:txBody>
+      </p:sp>
     </p:spTree>
     <p:extLst>
       <p:ext uri="{BB962C8B-B14F-4D97-AF65-F5344CB8AC3E}">

</xml_diff>